<commit_message>
added summary reports to pipeline
</commit_message>
<xml_diff>
--- a/figs/built_food_data_pipeline.pptx
+++ b/figs/built_food_data_pipeline.pptx
@@ -4569,9 +4569,9 @@
           <p:nvPr/>
         </p:nvCxnSpPr>
         <p:spPr>
-          <a:xfrm>
-            <a:off x="8661653" y="3169908"/>
-            <a:ext cx="665227" cy="786950"/>
+          <a:xfrm flipV="1">
+            <a:off x="8404723" y="1442423"/>
+            <a:ext cx="1312855" cy="939124"/>
           </a:xfrm>
           <a:prstGeom prst="straightConnector1">
             <a:avLst/>
@@ -4609,8 +4609,8 @@
         </p:nvSpPr>
         <p:spPr>
           <a:xfrm>
-            <a:off x="9411619" y="3956858"/>
-            <a:ext cx="1270236" cy="867627"/>
+            <a:off x="9838918" y="1008610"/>
+            <a:ext cx="1424426" cy="867627"/>
           </a:xfrm>
           <a:prstGeom prst="rect">
             <a:avLst/>
@@ -4667,8 +4667,8 @@
         </p:nvSpPr>
         <p:spPr>
           <a:xfrm>
-            <a:off x="9838918" y="3556055"/>
-            <a:ext cx="415637" cy="369332"/>
+            <a:off x="10246907" y="634294"/>
+            <a:ext cx="634453" cy="369332"/>
           </a:xfrm>
           <a:prstGeom prst="rect">
             <a:avLst/>
@@ -4686,11 +4686,188 @@
                 <a:latin typeface="Times New Roman" panose="02020603050405020304" pitchFamily="18" charset="0"/>
                 <a:cs typeface="Times New Roman" panose="02020603050405020304" pitchFamily="18" charset="0"/>
               </a:rPr>
-              <a:t>4_</a:t>
-            </a:r>
-          </a:p>
-        </p:txBody>
-      </p:sp>
+              <a:t>4a_</a:t>
+            </a:r>
+          </a:p>
+        </p:txBody>
+      </p:sp>
+      <p:sp>
+        <p:nvSpPr>
+          <p:cNvPr id="25" name="Rectangle 24">
+            <a:extLst>
+              <a:ext uri="{FF2B5EF4-FFF2-40B4-BE49-F238E27FC236}">
+                <a16:creationId xmlns:a16="http://schemas.microsoft.com/office/drawing/2014/main" id="{3FD3DD28-DD29-6B89-22AD-0EF1DCB54206}"/>
+              </a:ext>
+            </a:extLst>
+          </p:cNvPr>
+          <p:cNvSpPr/>
+          <p:nvPr/>
+        </p:nvSpPr>
+        <p:spPr>
+          <a:xfrm>
+            <a:off x="9851919" y="2736094"/>
+            <a:ext cx="1424427" cy="867627"/>
+          </a:xfrm>
+          <a:prstGeom prst="rect">
+            <a:avLst/>
+          </a:prstGeom>
+          <a:solidFill>
+            <a:srgbClr val="EABCBC"/>
+          </a:solidFill>
+        </p:spPr>
+        <p:style>
+          <a:lnRef idx="2">
+            <a:schemeClr val="accent1">
+              <a:shade val="50000"/>
+            </a:schemeClr>
+          </a:lnRef>
+          <a:fillRef idx="1">
+            <a:schemeClr val="accent1"/>
+          </a:fillRef>
+          <a:effectRef idx="0">
+            <a:schemeClr val="accent1"/>
+          </a:effectRef>
+          <a:fontRef idx="minor">
+            <a:schemeClr val="lt1"/>
+          </a:fontRef>
+        </p:style>
+        <p:txBody>
+          <a:bodyPr rtlCol="0" anchor="ctr"/>
+          <a:lstStyle/>
+          <a:p>
+            <a:pPr algn="ctr"/>
+            <a:r>
+              <a:rPr lang="en-US" sz="1400" dirty="0">
+                <a:solidFill>
+                  <a:schemeClr val="tx1"/>
+                </a:solidFill>
+                <a:latin typeface="Times New Roman" panose="02020603050405020304" pitchFamily="18" charset="0"/>
+                <a:cs typeface="Times New Roman" panose="02020603050405020304" pitchFamily="18" charset="0"/>
+              </a:rPr>
+              <a:t>Summary reports for project meetings (.</a:t>
+            </a:r>
+            <a:r>
+              <a:rPr lang="en-US" sz="1400" dirty="0" err="1">
+                <a:solidFill>
+                  <a:schemeClr val="tx1"/>
+                </a:solidFill>
+                <a:latin typeface="Times New Roman" panose="02020603050405020304" pitchFamily="18" charset="0"/>
+                <a:cs typeface="Times New Roman" panose="02020603050405020304" pitchFamily="18" charset="0"/>
+              </a:rPr>
+              <a:t>Rmd</a:t>
+            </a:r>
+            <a:r>
+              <a:rPr lang="en-US" sz="1400" dirty="0">
+                <a:solidFill>
+                  <a:schemeClr val="tx1"/>
+                </a:solidFill>
+                <a:latin typeface="Times New Roman" panose="02020603050405020304" pitchFamily="18" charset="0"/>
+                <a:cs typeface="Times New Roman" panose="02020603050405020304" pitchFamily="18" charset="0"/>
+              </a:rPr>
+              <a:t>, </a:t>
+            </a:r>
+            <a:r>
+              <a:rPr lang="en-US" sz="1400" dirty="0" err="1">
+                <a:solidFill>
+                  <a:schemeClr val="tx1"/>
+                </a:solidFill>
+                <a:latin typeface="Times New Roman" panose="02020603050405020304" pitchFamily="18" charset="0"/>
+                <a:cs typeface="Times New Roman" panose="02020603050405020304" pitchFamily="18" charset="0"/>
+              </a:rPr>
+              <a:t>pandoc</a:t>
+            </a:r>
+            <a:r>
+              <a:rPr lang="en-US" sz="1400" dirty="0">
+                <a:solidFill>
+                  <a:schemeClr val="tx1"/>
+                </a:solidFill>
+                <a:latin typeface="Times New Roman" panose="02020603050405020304" pitchFamily="18" charset="0"/>
+                <a:cs typeface="Times New Roman" panose="02020603050405020304" pitchFamily="18" charset="0"/>
+              </a:rPr>
+              <a:t>)</a:t>
+            </a:r>
+          </a:p>
+        </p:txBody>
+      </p:sp>
+      <p:sp>
+        <p:nvSpPr>
+          <p:cNvPr id="34" name="TextBox 33">
+            <a:extLst>
+              <a:ext uri="{FF2B5EF4-FFF2-40B4-BE49-F238E27FC236}">
+                <a16:creationId xmlns:a16="http://schemas.microsoft.com/office/drawing/2014/main" id="{6C30E499-B9A6-20DD-FE89-72229EC8D485}"/>
+              </a:ext>
+            </a:extLst>
+          </p:cNvPr>
+          <p:cNvSpPr txBox="1"/>
+          <p:nvPr/>
+        </p:nvSpPr>
+        <p:spPr>
+          <a:xfrm>
+            <a:off x="10246907" y="2323805"/>
+            <a:ext cx="634453" cy="369332"/>
+          </a:xfrm>
+          <a:prstGeom prst="rect">
+            <a:avLst/>
+          </a:prstGeom>
+          <a:noFill/>
+        </p:spPr>
+        <p:txBody>
+          <a:bodyPr wrap="square" rtlCol="0">
+            <a:spAutoFit/>
+          </a:bodyPr>
+          <a:lstStyle/>
+          <a:p>
+            <a:r>
+              <a:rPr lang="en-US" i="1" dirty="0">
+                <a:latin typeface="Times New Roman" panose="02020603050405020304" pitchFamily="18" charset="0"/>
+                <a:cs typeface="Times New Roman" panose="02020603050405020304" pitchFamily="18" charset="0"/>
+              </a:rPr>
+              <a:t>4b_</a:t>
+            </a:r>
+          </a:p>
+        </p:txBody>
+      </p:sp>
+      <p:cxnSp>
+        <p:nvCxnSpPr>
+          <p:cNvPr id="35" name="Straight Arrow Connector 34">
+            <a:extLst>
+              <a:ext uri="{FF2B5EF4-FFF2-40B4-BE49-F238E27FC236}">
+                <a16:creationId xmlns:a16="http://schemas.microsoft.com/office/drawing/2014/main" id="{E5313D43-8B66-09AF-69C3-8862135D228D}"/>
+              </a:ext>
+            </a:extLst>
+          </p:cNvPr>
+          <p:cNvCxnSpPr>
+            <a:cxnSpLocks/>
+          </p:cNvCxnSpPr>
+          <p:nvPr/>
+        </p:nvCxnSpPr>
+        <p:spPr>
+          <a:xfrm>
+            <a:off x="8645027" y="3142186"/>
+            <a:ext cx="1072551" cy="0"/>
+          </a:xfrm>
+          <a:prstGeom prst="straightConnector1">
+            <a:avLst/>
+          </a:prstGeom>
+          <a:ln>
+            <a:tailEnd type="triangle"/>
+          </a:ln>
+        </p:spPr>
+        <p:style>
+          <a:lnRef idx="1">
+            <a:schemeClr val="accent1"/>
+          </a:lnRef>
+          <a:fillRef idx="0">
+            <a:schemeClr val="accent1"/>
+          </a:fillRef>
+          <a:effectRef idx="0">
+            <a:schemeClr val="accent1"/>
+          </a:effectRef>
+          <a:fontRef idx="minor">
+            <a:schemeClr val="tx1"/>
+          </a:fontRef>
+        </p:style>
+      </p:cxnSp>
     </p:spTree>
     <p:extLst>
       <p:ext uri="{BB962C8B-B14F-4D97-AF65-F5344CB8AC3E}">

</xml_diff>